<commit_message>
Adding day 1 code examples
</commit_message>
<xml_diff>
--- a/powerpoints/Roc_Day01 - Programming_JavaBasics.pptx
+++ b/powerpoints/Roc_Day01 - Programming_JavaBasics.pptx
@@ -29546,15 +29546,7 @@
                   <a:srgbClr val="00FFFF"/>
                 </a:highlight>
               </a:rPr>
-              <a:t>Class</a:t>
-            </a:r>
-            <a:r>
-              <a:rPr lang="en-US" dirty="0">
-                <a:highlight>
-                  <a:srgbClr val="00FFFF"/>
-                </a:highlight>
-              </a:rPr>
-              <a:t> Name</a:t>
+              <a:t>ClassName</a:t>
             </a:r>
             <a:r>
               <a:rPr lang="en-US" dirty="0"/>

</xml_diff>